<commit_message>
updated email mispelling smh
</commit_message>
<xml_diff>
--- a/images/Images Creations (Venn Tools).pptx
+++ b/images/Images Creations (Venn Tools).pptx
@@ -8,6 +8,7 @@
     <p:sldId id="261" r:id="rId2"/>
     <p:sldId id="265" r:id="rId3"/>
     <p:sldId id="266" r:id="rId4"/>
+    <p:sldId id="267" r:id="rId5"/>
   </p:sldIdLst>
   <p:sldSz cx="12192000" cy="6858000"/>
   <p:notesSz cx="6858000" cy="9144000"/>
@@ -288,7 +289,7 @@
           <a:p>
             <a:fld id="{FE399230-328D-4161-A7A8-412A0F28ED17}" type="datetimeFigureOut">
               <a:rPr lang="en-US" smtClean="0"/>
-              <a:t>3/9/2021</a:t>
+              <a:t>3/12/2021</a:t>
             </a:fld>
             <a:endParaRPr lang="en-US" dirty="0"/>
           </a:p>
@@ -486,7 +487,7 @@
           <a:p>
             <a:fld id="{FE399230-328D-4161-A7A8-412A0F28ED17}" type="datetimeFigureOut">
               <a:rPr lang="en-US" smtClean="0"/>
-              <a:t>3/9/2021</a:t>
+              <a:t>3/12/2021</a:t>
             </a:fld>
             <a:endParaRPr lang="en-US" dirty="0"/>
           </a:p>
@@ -694,7 +695,7 @@
           <a:p>
             <a:fld id="{FE399230-328D-4161-A7A8-412A0F28ED17}" type="datetimeFigureOut">
               <a:rPr lang="en-US" smtClean="0"/>
-              <a:t>3/9/2021</a:t>
+              <a:t>3/12/2021</a:t>
             </a:fld>
             <a:endParaRPr lang="en-US" dirty="0"/>
           </a:p>
@@ -892,7 +893,7 @@
           <a:p>
             <a:fld id="{FE399230-328D-4161-A7A8-412A0F28ED17}" type="datetimeFigureOut">
               <a:rPr lang="en-US" smtClean="0"/>
-              <a:t>3/9/2021</a:t>
+              <a:t>3/12/2021</a:t>
             </a:fld>
             <a:endParaRPr lang="en-US" dirty="0"/>
           </a:p>
@@ -1167,7 +1168,7 @@
           <a:p>
             <a:fld id="{FE399230-328D-4161-A7A8-412A0F28ED17}" type="datetimeFigureOut">
               <a:rPr lang="en-US" smtClean="0"/>
-              <a:t>3/9/2021</a:t>
+              <a:t>3/12/2021</a:t>
             </a:fld>
             <a:endParaRPr lang="en-US" dirty="0"/>
           </a:p>
@@ -1432,7 +1433,7 @@
           <a:p>
             <a:fld id="{FE399230-328D-4161-A7A8-412A0F28ED17}" type="datetimeFigureOut">
               <a:rPr lang="en-US" smtClean="0"/>
-              <a:t>3/9/2021</a:t>
+              <a:t>3/12/2021</a:t>
             </a:fld>
             <a:endParaRPr lang="en-US" dirty="0"/>
           </a:p>
@@ -1844,7 +1845,7 @@
           <a:p>
             <a:fld id="{FE399230-328D-4161-A7A8-412A0F28ED17}" type="datetimeFigureOut">
               <a:rPr lang="en-US" smtClean="0"/>
-              <a:t>3/9/2021</a:t>
+              <a:t>3/12/2021</a:t>
             </a:fld>
             <a:endParaRPr lang="en-US" dirty="0"/>
           </a:p>
@@ -1985,7 +1986,7 @@
           <a:p>
             <a:fld id="{FE399230-328D-4161-A7A8-412A0F28ED17}" type="datetimeFigureOut">
               <a:rPr lang="en-US" smtClean="0"/>
-              <a:t>3/9/2021</a:t>
+              <a:t>3/12/2021</a:t>
             </a:fld>
             <a:endParaRPr lang="en-US" dirty="0"/>
           </a:p>
@@ -2098,7 +2099,7 @@
           <a:p>
             <a:fld id="{FE399230-328D-4161-A7A8-412A0F28ED17}" type="datetimeFigureOut">
               <a:rPr lang="en-US" smtClean="0"/>
-              <a:t>3/9/2021</a:t>
+              <a:t>3/12/2021</a:t>
             </a:fld>
             <a:endParaRPr lang="en-US" dirty="0"/>
           </a:p>
@@ -2409,7 +2410,7 @@
           <a:p>
             <a:fld id="{FE399230-328D-4161-A7A8-412A0F28ED17}" type="datetimeFigureOut">
               <a:rPr lang="en-US" smtClean="0"/>
-              <a:t>3/9/2021</a:t>
+              <a:t>3/12/2021</a:t>
             </a:fld>
             <a:endParaRPr lang="en-US" dirty="0"/>
           </a:p>
@@ -2697,7 +2698,7 @@
           <a:p>
             <a:fld id="{FE399230-328D-4161-A7A8-412A0F28ED17}" type="datetimeFigureOut">
               <a:rPr lang="en-US" smtClean="0"/>
-              <a:t>3/9/2021</a:t>
+              <a:t>3/12/2021</a:t>
             </a:fld>
             <a:endParaRPr lang="en-US" dirty="0"/>
           </a:p>
@@ -2938,7 +2939,7 @@
           <a:p>
             <a:fld id="{FE399230-328D-4161-A7A8-412A0F28ED17}" type="datetimeFigureOut">
               <a:rPr lang="en-US" smtClean="0"/>
-              <a:t>3/9/2021</a:t>
+              <a:t>3/12/2021</a:t>
             </a:fld>
             <a:endParaRPr lang="en-US" dirty="0"/>
           </a:p>
@@ -6176,7 +6177,7 @@
         <p:spPr>
           <a:xfrm>
             <a:off x="329184" y="1077532"/>
-            <a:ext cx="0" cy="2651760"/>
+            <a:ext cx="0" cy="2468880"/>
           </a:xfrm>
           <a:prstGeom prst="line">
             <a:avLst/>
@@ -6349,7 +6350,7 @@
         <p:spPr>
           <a:xfrm>
             <a:off x="3371088" y="1077532"/>
-            <a:ext cx="0" cy="2651760"/>
+            <a:ext cx="0" cy="2468880"/>
           </a:xfrm>
           <a:prstGeom prst="line">
             <a:avLst/>
@@ -6501,7 +6502,7 @@
               <a:rPr lang="en-US" sz="1400" dirty="0">
                 <a:latin typeface="Montserrat Black" panose="00000A00000000000000" pitchFamily="2" charset="0"/>
               </a:rPr>
-              <a:t>Account Management</a:t>
+              <a:t>CUSTOMER SUCCESS</a:t>
             </a:r>
           </a:p>
         </p:txBody>
@@ -6523,7 +6524,7 @@
         <p:spPr>
           <a:xfrm>
             <a:off x="6440424" y="1077532"/>
-            <a:ext cx="0" cy="2651760"/>
+            <a:ext cx="0" cy="2468880"/>
           </a:xfrm>
           <a:prstGeom prst="line">
             <a:avLst/>
@@ -6564,7 +6565,7 @@
         <p:spPr>
           <a:xfrm>
             <a:off x="329180" y="1470724"/>
-            <a:ext cx="3023613" cy="1954381"/>
+            <a:ext cx="3023613" cy="1869743"/>
           </a:xfrm>
           <a:prstGeom prst="rect">
             <a:avLst/>
@@ -6590,7 +6591,7 @@
               <a:buChar char="•"/>
             </a:pPr>
             <a:r>
-              <a:rPr lang="en-US" sz="1100" dirty="0">
+              <a:rPr lang="en-US" sz="1050" dirty="0">
                 <a:solidFill>
                   <a:schemeClr val="tx1">
                     <a:lumMod val="65000"/>
@@ -6613,7 +6614,7 @@
               <a:buFont typeface="Arial" panose="020B0604020202020204" pitchFamily="34" charset="0"/>
               <a:buChar char="•"/>
             </a:pPr>
-            <a:endParaRPr lang="en-US" sz="1100" dirty="0">
+            <a:endParaRPr lang="en-US" sz="1050" dirty="0">
               <a:solidFill>
                 <a:schemeClr val="tx1">
                   <a:lumMod val="65000"/>
@@ -6635,7 +6636,7 @@
               <a:buChar char="•"/>
             </a:pPr>
             <a:r>
-              <a:rPr lang="en-US" sz="1100" dirty="0">
+              <a:rPr lang="en-US" sz="1050" dirty="0">
                 <a:solidFill>
                   <a:schemeClr val="tx1">
                     <a:lumMod val="65000"/>
@@ -6658,7 +6659,7 @@
               <a:buFont typeface="Arial" panose="020B0604020202020204" pitchFamily="34" charset="0"/>
               <a:buChar char="•"/>
             </a:pPr>
-            <a:endParaRPr lang="en-US" sz="1100" dirty="0">
+            <a:endParaRPr lang="en-US" sz="1050" dirty="0">
               <a:solidFill>
                 <a:schemeClr val="tx1">
                   <a:lumMod val="65000"/>
@@ -6679,7 +6680,7 @@
               <a:buChar char="•"/>
             </a:pPr>
             <a:r>
-              <a:rPr lang="en-US" sz="1100" dirty="0">
+              <a:rPr lang="en-US" sz="1050" dirty="0">
                 <a:solidFill>
                   <a:schemeClr val="tx1">
                     <a:lumMod val="65000"/>
@@ -6701,7 +6702,7 @@
               <a:buFont typeface="Arial" panose="020B0604020202020204" pitchFamily="34" charset="0"/>
               <a:buChar char="•"/>
             </a:pPr>
-            <a:endParaRPr lang="en-US" sz="1100" dirty="0">
+            <a:endParaRPr lang="en-US" sz="1050" dirty="0">
               <a:solidFill>
                 <a:schemeClr val="tx1">
                   <a:lumMod val="65000"/>
@@ -6722,7 +6723,7 @@
               <a:buChar char="•"/>
             </a:pPr>
             <a:r>
-              <a:rPr lang="en-US" sz="1100" dirty="0">
+              <a:rPr lang="en-US" sz="1050" dirty="0">
                 <a:solidFill>
                   <a:schemeClr val="tx1">
                     <a:lumMod val="65000"/>
@@ -6751,7 +6752,7 @@
         <p:spPr>
           <a:xfrm>
             <a:off x="3371090" y="1470724"/>
-            <a:ext cx="3023613" cy="2123658"/>
+            <a:ext cx="3023613" cy="2031325"/>
           </a:xfrm>
           <a:prstGeom prst="rect">
             <a:avLst/>
@@ -6777,7 +6778,7 @@
               <a:buChar char="•"/>
             </a:pPr>
             <a:r>
-              <a:rPr lang="en-US" sz="1100" dirty="0">
+              <a:rPr lang="en-US" sz="1050" dirty="0">
                 <a:solidFill>
                   <a:schemeClr val="tx1">
                     <a:lumMod val="65000"/>
@@ -6800,7 +6801,7 @@
               <a:buFont typeface="Arial" panose="020B0604020202020204" pitchFamily="34" charset="0"/>
               <a:buChar char="•"/>
             </a:pPr>
-            <a:endParaRPr lang="en-US" sz="1100" dirty="0">
+            <a:endParaRPr lang="en-US" sz="1050" dirty="0">
               <a:solidFill>
                 <a:schemeClr val="tx1">
                   <a:lumMod val="65000"/>
@@ -6822,7 +6823,7 @@
               <a:buChar char="•"/>
             </a:pPr>
             <a:r>
-              <a:rPr lang="en-US" sz="1100" dirty="0">
+              <a:rPr lang="en-US" sz="1050" dirty="0">
                 <a:solidFill>
                   <a:schemeClr val="tx1">
                     <a:lumMod val="65000"/>
@@ -6845,7 +6846,7 @@
               <a:buFont typeface="Arial" panose="020B0604020202020204" pitchFamily="34" charset="0"/>
               <a:buChar char="•"/>
             </a:pPr>
-            <a:endParaRPr lang="en-US" sz="1100" dirty="0">
+            <a:endParaRPr lang="en-US" sz="1050" dirty="0">
               <a:solidFill>
                 <a:schemeClr val="tx1">
                   <a:lumMod val="65000"/>
@@ -6867,7 +6868,7 @@
               <a:buChar char="•"/>
             </a:pPr>
             <a:r>
-              <a:rPr lang="en-US" sz="1100" dirty="0">
+              <a:rPr lang="en-US" sz="1050" dirty="0">
                 <a:solidFill>
                   <a:schemeClr val="tx1">
                     <a:lumMod val="65000"/>
@@ -6890,7 +6891,7 @@
               <a:buFont typeface="Arial" panose="020B0604020202020204" pitchFamily="34" charset="0"/>
               <a:buChar char="•"/>
             </a:pPr>
-            <a:endParaRPr lang="en-US" sz="1100" dirty="0">
+            <a:endParaRPr lang="en-US" sz="1050" dirty="0">
               <a:solidFill>
                 <a:schemeClr val="tx1">
                   <a:lumMod val="65000"/>
@@ -6912,7 +6913,7 @@
               <a:buChar char="•"/>
             </a:pPr>
             <a:r>
-              <a:rPr lang="en-US" sz="1100" dirty="0">
+              <a:rPr lang="en-US" sz="1050" dirty="0">
                 <a:solidFill>
                   <a:schemeClr val="tx1">
                     <a:lumMod val="65000"/>
@@ -6924,7 +6925,7 @@
               </a:rPr>
               <a:t>Turn data into actionable insights for internal and external stakeholders</a:t>
             </a:r>
-            <a:endParaRPr lang="en-US" sz="1100" dirty="0">
+            <a:endParaRPr lang="en-US" sz="1050" dirty="0">
               <a:solidFill>
                 <a:schemeClr val="tx1">
                   <a:lumMod val="65000"/>
@@ -6951,7 +6952,7 @@
         <p:spPr>
           <a:xfrm>
             <a:off x="6440426" y="1470724"/>
-            <a:ext cx="3023613" cy="2631490"/>
+            <a:ext cx="3023613" cy="2354491"/>
           </a:xfrm>
           <a:prstGeom prst="rect">
             <a:avLst/>
@@ -6977,7 +6978,7 @@
               <a:buChar char="•"/>
             </a:pPr>
             <a:r>
-              <a:rPr lang="en-US" sz="1100" dirty="0">
+              <a:rPr lang="en-US" sz="1050" dirty="0">
                 <a:solidFill>
                   <a:schemeClr val="tx1">
                     <a:lumMod val="65000"/>
@@ -7000,7 +7001,7 @@
               <a:buFont typeface="Arial" panose="020B0604020202020204" pitchFamily="34" charset="0"/>
               <a:buChar char="•"/>
             </a:pPr>
-            <a:endParaRPr lang="en-US" sz="1100" dirty="0">
+            <a:endParaRPr lang="en-US" sz="1050" dirty="0">
               <a:solidFill>
                 <a:schemeClr val="tx1">
                   <a:lumMod val="65000"/>
@@ -7022,7 +7023,7 @@
               <a:buChar char="•"/>
             </a:pPr>
             <a:r>
-              <a:rPr lang="en-US" sz="1100" dirty="0">
+              <a:rPr lang="en-US" sz="1050" dirty="0">
                 <a:solidFill>
                   <a:schemeClr val="tx1">
                     <a:lumMod val="65000"/>
@@ -7045,7 +7046,7 @@
               <a:buFont typeface="Arial" panose="020B0604020202020204" pitchFamily="34" charset="0"/>
               <a:buChar char="•"/>
             </a:pPr>
-            <a:endParaRPr lang="en-US" sz="1100" dirty="0">
+            <a:endParaRPr lang="en-US" sz="1050" dirty="0">
               <a:solidFill>
                 <a:schemeClr val="tx1">
                   <a:lumMod val="65000"/>
@@ -7067,7 +7068,7 @@
               <a:buChar char="•"/>
             </a:pPr>
             <a:r>
-              <a:rPr lang="en-US" sz="1100" dirty="0">
+              <a:rPr lang="en-US" sz="1050" dirty="0">
                 <a:solidFill>
                   <a:schemeClr val="tx1">
                     <a:lumMod val="65000"/>
@@ -7090,7 +7091,7 @@
               <a:buFont typeface="Arial" panose="020B0604020202020204" pitchFamily="34" charset="0"/>
               <a:buChar char="•"/>
             </a:pPr>
-            <a:endParaRPr lang="en-US" sz="1100" dirty="0">
+            <a:endParaRPr lang="en-US" sz="1050" dirty="0">
               <a:solidFill>
                 <a:schemeClr val="tx1">
                   <a:lumMod val="65000"/>
@@ -7112,7 +7113,7 @@
               <a:buChar char="•"/>
             </a:pPr>
             <a:r>
-              <a:rPr lang="en-US" sz="1100" dirty="0">
+              <a:rPr lang="en-US" sz="1050" dirty="0">
                 <a:solidFill>
                   <a:schemeClr val="tx1">
                     <a:lumMod val="65000"/>
@@ -7135,7 +7136,7 @@
               <a:buFont typeface="Arial" panose="020B0604020202020204" pitchFamily="34" charset="0"/>
               <a:buChar char="•"/>
             </a:pPr>
-            <a:endParaRPr lang="en-US" sz="1100" dirty="0">
+            <a:endParaRPr lang="en-US" sz="1050" dirty="0">
               <a:solidFill>
                 <a:schemeClr val="tx1">
                   <a:lumMod val="65000"/>
@@ -7156,7 +7157,7 @@
               <a:buFont typeface="Arial" panose="020B0604020202020204" pitchFamily="34" charset="0"/>
               <a:buChar char="•"/>
             </a:pPr>
-            <a:endParaRPr lang="en-US" sz="1100" dirty="0">
+            <a:endParaRPr lang="en-US" sz="1050" dirty="0">
               <a:solidFill>
                 <a:schemeClr val="tx1">
                   <a:lumMod val="65000"/>
@@ -7172,6 +7173,169 @@
     <p:extLst>
       <p:ext uri="{BB962C8B-B14F-4D97-AF65-F5344CB8AC3E}">
         <p14:creationId xmlns:p14="http://schemas.microsoft.com/office/powerpoint/2010/main" val="358922135"/>
+      </p:ext>
+    </p:extLst>
+  </p:cSld>
+  <p:clrMapOvr>
+    <a:masterClrMapping/>
+  </p:clrMapOvr>
+</p:sld>
+</file>
+
+<file path=ppt/slides/slide4.xml><?xml version="1.0" encoding="utf-8"?>
+<p:sld xmlns:a="http://schemas.openxmlformats.org/drawingml/2006/main" xmlns:r="http://schemas.openxmlformats.org/officeDocument/2006/relationships" xmlns:p="http://schemas.openxmlformats.org/presentationml/2006/main">
+  <p:cSld>
+    <p:spTree>
+      <p:nvGrpSpPr>
+        <p:cNvPr id="1" name=""/>
+        <p:cNvGrpSpPr/>
+        <p:nvPr/>
+      </p:nvGrpSpPr>
+      <p:grpSpPr>
+        <a:xfrm>
+          <a:off x="0" y="0"/>
+          <a:ext cx="0" cy="0"/>
+          <a:chOff x="0" y="0"/>
+          <a:chExt cx="0" cy="0"/>
+        </a:xfrm>
+      </p:grpSpPr>
+      <p:sp>
+        <p:nvSpPr>
+          <p:cNvPr id="29" name="TextBox 28">
+            <a:extLst>
+              <a:ext uri="{FF2B5EF4-FFF2-40B4-BE49-F238E27FC236}">
+                <a16:creationId xmlns:a16="http://schemas.microsoft.com/office/drawing/2014/main" id="{494BE049-E553-4977-AF8C-EC9AC564F2CB}"/>
+              </a:ext>
+            </a:extLst>
+          </p:cNvPr>
+          <p:cNvSpPr txBox="1"/>
+          <p:nvPr/>
+        </p:nvSpPr>
+        <p:spPr>
+          <a:xfrm>
+            <a:off x="329184" y="934416"/>
+            <a:ext cx="2941319" cy="286232"/>
+          </a:xfrm>
+          <a:prstGeom prst="rect">
+            <a:avLst/>
+          </a:prstGeom>
+          <a:noFill/>
+        </p:spPr>
+        <p:txBody>
+          <a:bodyPr wrap="square">
+            <a:spAutoFit/>
+          </a:bodyPr>
+          <a:lstStyle/>
+          <a:p>
+            <a:pPr algn="ctr" defTabSz="2222500">
+              <a:lnSpc>
+                <a:spcPct val="90000"/>
+              </a:lnSpc>
+              <a:spcBef>
+                <a:spcPct val="0"/>
+              </a:spcBef>
+              <a:spcAft>
+                <a:spcPct val="35000"/>
+              </a:spcAft>
+            </a:pPr>
+            <a:r>
+              <a:rPr lang="en-US" sz="1400" dirty="0">
+                <a:solidFill>
+                  <a:schemeClr val="bg1"/>
+                </a:solidFill>
+                <a:latin typeface="Montserrat Black" panose="00000A00000000000000" pitchFamily="2" charset="0"/>
+              </a:rPr>
+              <a:t>Product Management</a:t>
+            </a:r>
+          </a:p>
+        </p:txBody>
+      </p:sp>
+      <p:cxnSp>
+        <p:nvCxnSpPr>
+          <p:cNvPr id="7" name="Straight Connector 6">
+            <a:extLst>
+              <a:ext uri="{FF2B5EF4-FFF2-40B4-BE49-F238E27FC236}">
+                <a16:creationId xmlns:a16="http://schemas.microsoft.com/office/drawing/2014/main" id="{E9A57772-D7D7-42D0-B3CF-E8EFFD76E523}"/>
+              </a:ext>
+            </a:extLst>
+          </p:cNvPr>
+          <p:cNvCxnSpPr>
+            <a:cxnSpLocks/>
+          </p:cNvCxnSpPr>
+          <p:nvPr/>
+        </p:nvCxnSpPr>
+        <p:spPr>
+          <a:xfrm>
+            <a:off x="218089" y="0"/>
+            <a:ext cx="0" cy="6949440"/>
+          </a:xfrm>
+          <a:prstGeom prst="line">
+            <a:avLst/>
+          </a:prstGeom>
+          <a:ln w="9525"/>
+        </p:spPr>
+        <p:style>
+          <a:lnRef idx="1">
+            <a:schemeClr val="accent1"/>
+          </a:lnRef>
+          <a:fillRef idx="0">
+            <a:schemeClr val="accent1"/>
+          </a:fillRef>
+          <a:effectRef idx="0">
+            <a:schemeClr val="accent1"/>
+          </a:effectRef>
+          <a:fontRef idx="minor">
+            <a:schemeClr val="tx1"/>
+          </a:fontRef>
+        </p:style>
+      </p:cxnSp>
+      <p:cxnSp>
+        <p:nvCxnSpPr>
+          <p:cNvPr id="40" name="Straight Connector 39">
+            <a:extLst>
+              <a:ext uri="{FF2B5EF4-FFF2-40B4-BE49-F238E27FC236}">
+                <a16:creationId xmlns:a16="http://schemas.microsoft.com/office/drawing/2014/main" id="{1F06DCD6-D047-4F9E-B47B-E3BDD2D77C6B}"/>
+              </a:ext>
+            </a:extLst>
+          </p:cNvPr>
+          <p:cNvCxnSpPr>
+            <a:cxnSpLocks/>
+          </p:cNvCxnSpPr>
+          <p:nvPr/>
+        </p:nvCxnSpPr>
+        <p:spPr>
+          <a:xfrm>
+            <a:off x="9474181" y="0"/>
+            <a:ext cx="0" cy="6949440"/>
+          </a:xfrm>
+          <a:prstGeom prst="line">
+            <a:avLst/>
+          </a:prstGeom>
+          <a:ln w="9525">
+            <a:solidFill>
+              <a:schemeClr val="accent3"/>
+            </a:solidFill>
+          </a:ln>
+        </p:spPr>
+        <p:style>
+          <a:lnRef idx="1">
+            <a:schemeClr val="accent1"/>
+          </a:lnRef>
+          <a:fillRef idx="0">
+            <a:schemeClr val="accent1"/>
+          </a:fillRef>
+          <a:effectRef idx="0">
+            <a:schemeClr val="accent1"/>
+          </a:effectRef>
+          <a:fontRef idx="minor">
+            <a:schemeClr val="tx1"/>
+          </a:fontRef>
+        </p:style>
+      </p:cxnSp>
+    </p:spTree>
+    <p:extLst>
+      <p:ext uri="{BB962C8B-B14F-4D97-AF65-F5344CB8AC3E}">
+        <p14:creationId xmlns:p14="http://schemas.microsoft.com/office/powerpoint/2010/main" val="2065595223"/>
       </p:ext>
     </p:extLst>
   </p:cSld>

</xml_diff>